<commit_message>
updating lecture 1 materials
</commit_message>
<xml_diff>
--- a/Lecture 1/Lecture 1 Intro to R.pptx
+++ b/Lecture 1/Lecture 1 Intro to R.pptx
@@ -5,7 +5,7 @@
     <p:sldMasterId id="2147483672" r:id="rId1"/>
   </p:sldMasterIdLst>
   <p:notesMasterIdLst>
-    <p:notesMasterId r:id="rId17"/>
+    <p:notesMasterId r:id="rId16"/>
   </p:notesMasterIdLst>
   <p:sldIdLst>
     <p:sldId id="256" r:id="rId2"/>
@@ -22,7 +22,6 @@
     <p:sldId id="268" r:id="rId13"/>
     <p:sldId id="260" r:id="rId14"/>
     <p:sldId id="269" r:id="rId15"/>
-    <p:sldId id="257" r:id="rId16"/>
   </p:sldIdLst>
   <p:sldSz cx="12192000" cy="6858000"/>
   <p:notesSz cx="6858000" cy="9144000"/>
@@ -137,6 +136,35 @@
 </p1510:revInfo>
 </file>
 
+<file path=ppt/changesInfos/changesInfo1.xml><?xml version="1.0" encoding="utf-8"?>
+<pc:chgInfo xmlns:a="http://schemas.openxmlformats.org/drawingml/2006/main" xmlns:r="http://schemas.openxmlformats.org/officeDocument/2006/relationships" xmlns:ac="http://schemas.microsoft.com/office/drawing/2013/main/command" xmlns:pc="http://schemas.microsoft.com/office/powerpoint/2013/main/command">
+  <pc:docChgLst>
+    <pc:chgData name="Sonia Tara Hegde" userId="d93a2558-a889-4521-bcb4-6ed3fce9e012" providerId="ADAL" clId="{8F23145C-A13B-A342-8814-4A755A7320F9}"/>
+    <pc:docChg chg="custSel delSld modSld">
+      <pc:chgData name="Sonia Tara Hegde" userId="d93a2558-a889-4521-bcb4-6ed3fce9e012" providerId="ADAL" clId="{8F23145C-A13B-A342-8814-4A755A7320F9}" dt="2025-05-13T22:08:55.192" v="145" actId="2696"/>
+      <pc:docMkLst>
+        <pc:docMk/>
+      </pc:docMkLst>
+      <pc:sldChg chg="modSp del mod">
+        <pc:chgData name="Sonia Tara Hegde" userId="d93a2558-a889-4521-bcb4-6ed3fce9e012" providerId="ADAL" clId="{8F23145C-A13B-A342-8814-4A755A7320F9}" dt="2025-05-13T22:08:55.192" v="145" actId="2696"/>
+        <pc:sldMkLst>
+          <pc:docMk/>
+          <pc:sldMk cId="667854191" sldId="257"/>
+        </pc:sldMkLst>
+        <pc:spChg chg="mod">
+          <ac:chgData name="Sonia Tara Hegde" userId="d93a2558-a889-4521-bcb4-6ed3fce9e012" providerId="ADAL" clId="{8F23145C-A13B-A342-8814-4A755A7320F9}" dt="2025-05-13T22:08:49.876" v="144" actId="1076"/>
+          <ac:spMkLst>
+            <pc:docMk/>
+            <pc:sldMk cId="667854191" sldId="257"/>
+            <ac:spMk id="4" creationId="{06C694A5-F9E5-237C-AF1C-4F6A7181AB37}"/>
+          </ac:spMkLst>
+        </pc:spChg>
+      </pc:sldChg>
+    </pc:docChg>
+  </pc:docChgLst>
+</pc:chgInfo>
+</file>
+
 <file path=ppt/notesMasters/notesMaster1.xml><?xml version="1.0" encoding="utf-8"?>
 <p:notesMaster xmlns:a="http://schemas.openxmlformats.org/drawingml/2006/main" xmlns:r="http://schemas.openxmlformats.org/officeDocument/2006/relationships" xmlns:p="http://schemas.openxmlformats.org/presentationml/2006/main">
   <p:cSld>
@@ -219,7 +247,7 @@
           <a:p>
             <a:fld id="{EE2E33BD-E1BA-3C4D-B01A-FFAC454B8D70}" type="datetimeFigureOut">
               <a:rPr lang="en-US" smtClean="0"/>
-              <a:t>5/12/25</a:t>
+              <a:t>5/13/25</a:t>
             </a:fld>
             <a:endParaRPr lang="en-US"/>
           </a:p>
@@ -983,90 +1011,6 @@
     <p:extLst>
       <p:ext uri="{BB962C8B-B14F-4D97-AF65-F5344CB8AC3E}">
         <p14:creationId xmlns:p14="http://schemas.microsoft.com/office/powerpoint/2010/main" val="3980184495"/>
-      </p:ext>
-    </p:extLst>
-  </p:cSld>
-  <p:clrMapOvr>
-    <a:masterClrMapping/>
-  </p:clrMapOvr>
-</p:notes>
-</file>
-
-<file path=ppt/notesSlides/notesSlide3.xml><?xml version="1.0" encoding="utf-8"?>
-<p:notes xmlns:a="http://schemas.openxmlformats.org/drawingml/2006/main" xmlns:r="http://schemas.openxmlformats.org/officeDocument/2006/relationships" xmlns:p="http://schemas.openxmlformats.org/presentationml/2006/main">
-  <p:cSld>
-    <p:spTree>
-      <p:nvGrpSpPr>
-        <p:cNvPr id="1" name=""/>
-        <p:cNvGrpSpPr/>
-        <p:nvPr/>
-      </p:nvGrpSpPr>
-      <p:grpSpPr>
-        <a:xfrm>
-          <a:off x="0" y="0"/>
-          <a:ext cx="0" cy="0"/>
-          <a:chOff x="0" y="0"/>
-          <a:chExt cx="0" cy="0"/>
-        </a:xfrm>
-      </p:grpSpPr>
-      <p:sp>
-        <p:nvSpPr>
-          <p:cNvPr id="2" name="Slide Image Placeholder 1"/>
-          <p:cNvSpPr>
-            <a:spLocks noGrp="1" noRot="1" noChangeAspect="1"/>
-          </p:cNvSpPr>
-          <p:nvPr>
-            <p:ph type="sldImg"/>
-          </p:nvPr>
-        </p:nvSpPr>
-        <p:spPr/>
-      </p:sp>
-      <p:sp>
-        <p:nvSpPr>
-          <p:cNvPr id="3" name="Notes Placeholder 2"/>
-          <p:cNvSpPr>
-            <a:spLocks noGrp="1"/>
-          </p:cNvSpPr>
-          <p:nvPr>
-            <p:ph type="body" idx="1"/>
-          </p:nvPr>
-        </p:nvSpPr>
-        <p:spPr/>
-        <p:txBody>
-          <a:bodyPr/>
-          <a:lstStyle/>
-          <a:p>
-            <a:endParaRPr lang="en-US" dirty="0"/>
-          </a:p>
-        </p:txBody>
-      </p:sp>
-      <p:sp>
-        <p:nvSpPr>
-          <p:cNvPr id="4" name="Slide Number Placeholder 3"/>
-          <p:cNvSpPr>
-            <a:spLocks noGrp="1"/>
-          </p:cNvSpPr>
-          <p:nvPr>
-            <p:ph type="sldNum" sz="quarter" idx="5"/>
-          </p:nvPr>
-        </p:nvSpPr>
-        <p:spPr/>
-        <p:txBody>
-          <a:bodyPr/>
-          <a:lstStyle/>
-          <a:p>
-            <a:fld id="{A74AB30A-E790-D740-AB31-4816B60BCCB6}" type="slidenum">
-              <a:rPr lang="en-US" smtClean="0"/>
-              <a:t>15</a:t>
-            </a:fld>
-            <a:endParaRPr lang="en-US"/>
-          </a:p>
-        </p:txBody>
-      </p:sp>
-    </p:spTree>
-    <p:extLst>
-      <p:ext uri="{BB962C8B-B14F-4D97-AF65-F5344CB8AC3E}">
-        <p14:creationId xmlns:p14="http://schemas.microsoft.com/office/powerpoint/2010/main" val="378512699"/>
       </p:ext>
     </p:extLst>
   </p:cSld>
@@ -5420,187 +5364,6 @@
     <p:extLst>
       <p:ext uri="{BB962C8B-B14F-4D97-AF65-F5344CB8AC3E}">
         <p14:creationId xmlns:p14="http://schemas.microsoft.com/office/powerpoint/2010/main" val="3291686408"/>
-      </p:ext>
-    </p:extLst>
-  </p:cSld>
-  <p:clrMapOvr>
-    <a:masterClrMapping/>
-  </p:clrMapOvr>
-</p:sld>
-</file>
-
-<file path=ppt/slides/slide15.xml><?xml version="1.0" encoding="utf-8"?>
-<p:sld xmlns:a="http://schemas.openxmlformats.org/drawingml/2006/main" xmlns:r="http://schemas.openxmlformats.org/officeDocument/2006/relationships" xmlns:p="http://schemas.openxmlformats.org/presentationml/2006/main">
-  <p:cSld>
-    <p:spTree>
-      <p:nvGrpSpPr>
-        <p:cNvPr id="1" name=""/>
-        <p:cNvGrpSpPr/>
-        <p:nvPr/>
-      </p:nvGrpSpPr>
-      <p:grpSpPr>
-        <a:xfrm>
-          <a:off x="0" y="0"/>
-          <a:ext cx="0" cy="0"/>
-          <a:chOff x="0" y="0"/>
-          <a:chExt cx="0" cy="0"/>
-        </a:xfrm>
-      </p:grpSpPr>
-      <p:sp>
-        <p:nvSpPr>
-          <p:cNvPr id="4" name="TextBox 3">
-            <a:extLst>
-              <a:ext uri="{FF2B5EF4-FFF2-40B4-BE49-F238E27FC236}">
-                <a16:creationId xmlns:a16="http://schemas.microsoft.com/office/drawing/2014/main" id="{06C694A5-F9E5-237C-AF1C-4F6A7181AB37}"/>
-              </a:ext>
-            </a:extLst>
-          </p:cNvPr>
-          <p:cNvSpPr txBox="1"/>
-          <p:nvPr/>
-        </p:nvSpPr>
-        <p:spPr>
-          <a:xfrm>
-            <a:off x="535641" y="1843950"/>
-            <a:ext cx="11120717" cy="2015936"/>
-          </a:xfrm>
-          <a:prstGeom prst="rect">
-            <a:avLst/>
-          </a:prstGeom>
-          <a:noFill/>
-        </p:spPr>
-        <p:txBody>
-          <a:bodyPr wrap="square">
-            <a:spAutoFit/>
-          </a:bodyPr>
-          <a:lstStyle/>
-          <a:p>
-            <a:pPr marL="742950" lvl="1" indent="-285750">
-              <a:buFont typeface="Arial" panose="020B0604020202020204" pitchFamily="34" charset="0"/>
-              <a:buChar char="•"/>
-            </a:pPr>
-            <a:r>
-              <a:rPr lang="en-US" sz="2500" dirty="0">
-                <a:effectLst/>
-                <a:latin typeface="Helvetica Neue" panose="02000503000000020004" pitchFamily="2" charset="0"/>
-              </a:rPr>
-              <a:t>What is a source script and how to run it in R</a:t>
-            </a:r>
-          </a:p>
-          <a:p>
-            <a:pPr marL="742950" lvl="1" indent="-285750">
-              <a:buFont typeface="Arial" panose="020B0604020202020204" pitchFamily="34" charset="0"/>
-              <a:buChar char="•"/>
-            </a:pPr>
-            <a:r>
-              <a:rPr lang="en-US" sz="2500" dirty="0" err="1">
-                <a:solidFill>
-                  <a:srgbClr val="000000"/>
-                </a:solidFill>
-                <a:latin typeface="Helvetica Neue" panose="02000503000000020004" pitchFamily="2" charset="0"/>
-              </a:rPr>
-              <a:t>E</a:t>
-            </a:r>
-            <a:r>
-              <a:rPr lang="en-US" sz="2500" b="0" i="0" u="none" strike="noStrike" dirty="0" err="1">
-                <a:solidFill>
-                  <a:srgbClr val="000000"/>
-                </a:solidFill>
-                <a:effectLst/>
-                <a:latin typeface="Helvetica Neue" panose="02000503000000020004" pitchFamily="2" charset="0"/>
-              </a:rPr>
-              <a:t>pitools</a:t>
-            </a:r>
-            <a:r>
-              <a:rPr lang="en-US" sz="2500" b="0" i="0" u="none" strike="noStrike" dirty="0">
-                <a:solidFill>
-                  <a:srgbClr val="000000"/>
-                </a:solidFill>
-                <a:effectLst/>
-                <a:latin typeface="Helvetica Neue" panose="02000503000000020004" pitchFamily="2" charset="0"/>
-              </a:rPr>
-              <a:t> package</a:t>
-            </a:r>
-          </a:p>
-          <a:p>
-            <a:pPr marL="742950" lvl="1" indent="-285750">
-              <a:buFont typeface="Arial" panose="020B0604020202020204" pitchFamily="34" charset="0"/>
-              <a:buChar char="•"/>
-            </a:pPr>
-            <a:r>
-              <a:rPr lang="en-US" sz="2500" b="0" i="0" u="none" strike="noStrike" dirty="0">
-                <a:solidFill>
-                  <a:srgbClr val="000000"/>
-                </a:solidFill>
-                <a:effectLst/>
-                <a:latin typeface="Helvetica Neue" panose="02000503000000020004" pitchFamily="2" charset="0"/>
-              </a:rPr>
-              <a:t>Talk about what you find in raw Luminex csv file (checking calibration date, plate ID, plate run date, </a:t>
-            </a:r>
-            <a:r>
-              <a:rPr lang="en-US" sz="2500" b="0" i="0" u="none" strike="noStrike" dirty="0" err="1">
-                <a:solidFill>
-                  <a:srgbClr val="000000"/>
-                </a:solidFill>
-                <a:effectLst/>
-                <a:latin typeface="Helvetica Neue" panose="02000503000000020004" pitchFamily="2" charset="0"/>
-              </a:rPr>
-              <a:t>etc</a:t>
-            </a:r>
-            <a:r>
-              <a:rPr lang="en-US" sz="2500" b="0" i="0" u="none" strike="noStrike" dirty="0">
-                <a:solidFill>
-                  <a:srgbClr val="000000"/>
-                </a:solidFill>
-                <a:effectLst/>
-                <a:latin typeface="Helvetica Neue" panose="02000503000000020004" pitchFamily="2" charset="0"/>
-              </a:rPr>
-              <a:t>)</a:t>
-            </a:r>
-          </a:p>
-          <a:p>
-            <a:pPr marL="742950" lvl="1" indent="-285750">
-              <a:buFont typeface="Arial" panose="020B0604020202020204" pitchFamily="34" charset="0"/>
-              <a:buChar char="•"/>
-            </a:pPr>
-            <a:endParaRPr lang="en-US" sz="2500" dirty="0">
-              <a:effectLst/>
-              <a:latin typeface="Helvetica Neue" panose="02000503000000020004" pitchFamily="2" charset="0"/>
-            </a:endParaRPr>
-          </a:p>
-        </p:txBody>
-      </p:sp>
-      <p:sp>
-        <p:nvSpPr>
-          <p:cNvPr id="5" name="Title 4">
-            <a:extLst>
-              <a:ext uri="{FF2B5EF4-FFF2-40B4-BE49-F238E27FC236}">
-                <a16:creationId xmlns:a16="http://schemas.microsoft.com/office/drawing/2014/main" id="{11CE2F85-6804-F2BF-369D-2A2AED841FC1}"/>
-              </a:ext>
-            </a:extLst>
-          </p:cNvPr>
-          <p:cNvSpPr>
-            <a:spLocks noGrp="1"/>
-          </p:cNvSpPr>
-          <p:nvPr>
-            <p:ph type="title"/>
-          </p:nvPr>
-        </p:nvSpPr>
-        <p:spPr/>
-        <p:txBody>
-          <a:bodyPr/>
-          <a:lstStyle/>
-          <a:p>
-            <a:r>
-              <a:rPr lang="en-US" dirty="0"/>
-              <a:t>What else to add to this lecture?</a:t>
-            </a:r>
-          </a:p>
-        </p:txBody>
-      </p:sp>
-    </p:spTree>
-    <p:extLst>
-      <p:ext uri="{BB962C8B-B14F-4D97-AF65-F5344CB8AC3E}">
-        <p14:creationId xmlns:p14="http://schemas.microsoft.com/office/powerpoint/2010/main" val="667854191"/>
       </p:ext>
     </p:extLst>
   </p:cSld>

</xml_diff>